<commit_message>
updated the first presentation slides
</commit_message>
<xml_diff>
--- a/project_presentation.pptx
+++ b/project_presentation.pptx
@@ -230,7 +230,7 @@
           <a:p>
             <a:fld id="{92F47466-C257-5E4D-B900-FDF6B78F5F15}" type="datetimeFigureOut">
               <a:rPr lang="de-DE" smtClean="0"/>
-              <a:t>18.03.2019</a:t>
+              <a:t>19.03.2019</a:t>
             </a:fld>
             <a:endParaRPr lang="de-DE"/>
           </a:p>
@@ -396,7 +396,7 @@
           <a:p>
             <a:fld id="{7A19BEE0-598C-4858-A439-753E34679212}" type="datetimeFigureOut">
               <a:rPr lang="de-AT" smtClean="0"/>
-              <a:t>18.03.2019</a:t>
+              <a:t>19.03.2019</a:t>
             </a:fld>
             <a:endParaRPr lang="de-AT"/>
           </a:p>
@@ -3417,36 +3417,16 @@
           <a:lstStyle/>
           <a:p>
             <a:r>
+              <a:rPr lang="de-AT" dirty="0"/>
+              <a:t>Data Analytics </a:t>
+            </a:r>
+            <a:r>
               <a:rPr lang="de-AT" dirty="0" err="1"/>
-              <a:t>Comparing</a:t>
+              <a:t>with</a:t>
             </a:r>
             <a:r>
               <a:rPr lang="de-AT" dirty="0"/>
-              <a:t> a </a:t>
-            </a:r>
-            <a:r>
-              <a:rPr lang="de-AT" dirty="0" err="1"/>
-              <a:t>pandas</a:t>
-            </a:r>
-            <a:r>
-              <a:rPr lang="de-AT" dirty="0"/>
-              <a:t> </a:t>
-            </a:r>
-            <a:r>
-              <a:rPr lang="de-AT" dirty="0" err="1"/>
-              <a:t>library</a:t>
-            </a:r>
-            <a:r>
-              <a:rPr lang="de-AT" dirty="0"/>
-              <a:t> </a:t>
-            </a:r>
-            <a:r>
-              <a:rPr lang="de-AT" dirty="0" err="1"/>
-              <a:t>to</a:t>
-            </a:r>
-            <a:r>
-              <a:rPr lang="de-AT" dirty="0"/>
-              <a:t> a RDBMS</a:t>
+              <a:t> Python (Pandas)</a:t>
             </a:r>
           </a:p>
         </p:txBody>
@@ -3471,7 +3451,7 @@
               <a:t>First </a:t>
             </a:r>
             <a:r>
-              <a:rPr lang="de-AT" dirty="0" err="1"/>
+              <a:rPr lang="en-GB" dirty="0"/>
               <a:t>presentation</a:t>
             </a:r>
             <a:r>
@@ -3832,7 +3812,7 @@
             </a:pPr>
             <a:r>
               <a:rPr lang="en-GB" dirty="0"/>
-              <a:t>  Main purpose: providing data structures and operations for manipulating numeric tables </a:t>
+              <a:t>Main purpose: providing data structures and operations for manipulating numeric tables </a:t>
             </a:r>
           </a:p>
           <a:p>
@@ -3973,7 +3953,7 @@
         </p:blipFill>
         <p:spPr>
           <a:xfrm>
-            <a:off x="3944431" y="856958"/>
+            <a:off x="3944431" y="666296"/>
             <a:ext cx="2794124" cy="1449583"/>
           </a:xfrm>
           <a:prstGeom prst="rect">
@@ -4241,12 +4221,8 @@
               </a:spcBef>
             </a:pPr>
             <a:r>
-              <a:rPr lang="en-GB" dirty="0" err="1"/>
-              <a:t>Fulfill</a:t>
-            </a:r>
-            <a:r>
               <a:rPr lang="en-GB" dirty="0"/>
-              <a:t> all three goals from previous slide </a:t>
+              <a:t>Fulfil all three goals from previous slide </a:t>
             </a:r>
             <a:br>
               <a:rPr lang="en-GB" dirty="0"/>
@@ -4261,15 +4237,7 @@
             </a:pPr>
             <a:r>
               <a:rPr lang="en-GB" dirty="0"/>
-              <a:t>Nice-to-have: Check out visualization tools </a:t>
-            </a:r>
-            <a:r>
-              <a:rPr lang="en-GB" dirty="0" err="1"/>
-              <a:t>für</a:t>
-            </a:r>
-            <a:r>
-              <a:rPr lang="en-GB" dirty="0"/>
-              <a:t> pandas </a:t>
+              <a:t>Nice-to-have: Check out visualization tools for pandas </a:t>
             </a:r>
             <a:br>
               <a:rPr lang="en-GB" dirty="0"/>

</xml_diff>